<commit_message>
Added duty cycles, formatted Thermal presentation
</commit_message>
<xml_diff>
--- a/Files/Experts review.pptx
+++ b/Files/Experts review.pptx
@@ -1364,11 +1364,12 @@
           <a:lstStyle/>
           <a:p>
             <a:pPr algn="ctr"/>
-            <a:endParaRPr lang="en-US" dirty="0">
-              <a:solidFill>
-                <a:schemeClr val="bg1"/>
-              </a:solidFill>
-            </a:endParaRPr>
+            <a:r>
+              <a:rPr lang="fr-FR" i="0" dirty="0">
+                <a:latin typeface="Arial Nova Light" panose="020B0304020202020204" pitchFamily="34" charset="0"/>
+              </a:rPr>
+              <a:t>May 28, 2019</a:t>
+            </a:r>
           </a:p>
         </p:txBody>
       </p:sp>
@@ -1467,6 +1468,16 @@
           <a:p>
             <a:pPr algn="ctr"/>
             <a:r>
+              <a:rPr lang="fr-FR" sz="2000" b="1" dirty="0">
+                <a:solidFill>
+                  <a:schemeClr val="tx1"/>
+                </a:solidFill>
+                <a:latin typeface="Arial Nova Light" panose="020B0304020202020204" pitchFamily="34" charset="0"/>
+                <a:cs typeface="Arial Nova Light" panose="020B0304020202020204" pitchFamily="34" charset="0"/>
+              </a:rPr>
+              <a:t>Project</a:t>
+            </a:r>
+            <a:r>
               <a:rPr lang="fr-FR" sz="2000" dirty="0">
                 <a:solidFill>
                   <a:schemeClr val="tx1"/>
@@ -1474,9 +1485,19 @@
                 <a:latin typeface="Arial Nova Light" panose="020B0304020202020204" pitchFamily="34" charset="0"/>
                 <a:cs typeface="Arial Nova Light" panose="020B0304020202020204" pitchFamily="34" charset="0"/>
               </a:rPr>
-              <a:t>Project TOLOSAT</a:t>
-            </a:r>
-            <a:endParaRPr lang="en-US" sz="2000" dirty="0">
+              <a:t> </a:t>
+            </a:r>
+            <a:r>
+              <a:rPr lang="fr-FR" sz="2000" b="1" dirty="0">
+                <a:solidFill>
+                  <a:schemeClr val="tx1"/>
+                </a:solidFill>
+                <a:latin typeface="Arial Nova Light" panose="020B0304020202020204" pitchFamily="34" charset="0"/>
+                <a:cs typeface="Arial Nova Light" panose="020B0304020202020204" pitchFamily="34" charset="0"/>
+              </a:rPr>
+              <a:t>TOLOSAT</a:t>
+            </a:r>
+            <a:endParaRPr lang="en-US" sz="2000" b="1" dirty="0">
               <a:solidFill>
                 <a:schemeClr val="tx1"/>
               </a:solidFill>
@@ -3262,7 +3283,7 @@
         </p:nvSpPr>
         <p:spPr>
           <a:xfrm>
-            <a:off x="8188377" y="4010058"/>
+            <a:off x="4347566" y="3991397"/>
             <a:ext cx="3426780" cy="369332"/>
           </a:xfrm>
           <a:prstGeom prst="rect">
@@ -3276,6 +3297,7 @@
           </a:bodyPr>
           <a:lstStyle/>
           <a:p>
+            <a:pPr algn="ctr"/>
             <a:r>
               <a:rPr lang="fr-FR" dirty="0" err="1"/>
               <a:t>Presented</a:t>
@@ -3287,6 +3309,78 @@
           </a:p>
         </p:txBody>
       </p:sp>
+      <p:cxnSp>
+        <p:nvCxnSpPr>
+          <p:cNvPr id="3" name="Straight Connector 2">
+            <a:extLst>
+              <a:ext uri="{FF2B5EF4-FFF2-40B4-BE49-F238E27FC236}">
+                <a16:creationId xmlns:a16="http://schemas.microsoft.com/office/drawing/2014/main" id="{8592F59C-3A3D-4EAC-9665-1EC59975518F}"/>
+              </a:ext>
+            </a:extLst>
+          </p:cNvPr>
+          <p:cNvCxnSpPr/>
+          <p:nvPr/>
+        </p:nvCxnSpPr>
+        <p:spPr>
+          <a:xfrm>
+            <a:off x="4254759" y="3978956"/>
+            <a:ext cx="3607837" cy="0"/>
+          </a:xfrm>
+          <a:prstGeom prst="line">
+            <a:avLst/>
+          </a:prstGeom>
+        </p:spPr>
+        <p:style>
+          <a:lnRef idx="1">
+            <a:schemeClr val="dk1"/>
+          </a:lnRef>
+          <a:fillRef idx="0">
+            <a:schemeClr val="dk1"/>
+          </a:fillRef>
+          <a:effectRef idx="0">
+            <a:schemeClr val="dk1"/>
+          </a:effectRef>
+          <a:fontRef idx="minor">
+            <a:schemeClr val="tx1"/>
+          </a:fontRef>
+        </p:style>
+      </p:cxnSp>
+      <p:cxnSp>
+        <p:nvCxnSpPr>
+          <p:cNvPr id="9" name="Straight Connector 8">
+            <a:extLst>
+              <a:ext uri="{FF2B5EF4-FFF2-40B4-BE49-F238E27FC236}">
+                <a16:creationId xmlns:a16="http://schemas.microsoft.com/office/drawing/2014/main" id="{81635AE1-2E8F-4E76-9C3C-85C41C06B952}"/>
+              </a:ext>
+            </a:extLst>
+          </p:cNvPr>
+          <p:cNvCxnSpPr/>
+          <p:nvPr/>
+        </p:nvCxnSpPr>
+        <p:spPr>
+          <a:xfrm>
+            <a:off x="4254758" y="4373170"/>
+            <a:ext cx="3607837" cy="0"/>
+          </a:xfrm>
+          <a:prstGeom prst="line">
+            <a:avLst/>
+          </a:prstGeom>
+        </p:spPr>
+        <p:style>
+          <a:lnRef idx="1">
+            <a:schemeClr val="dk1"/>
+          </a:lnRef>
+          <a:fillRef idx="0">
+            <a:schemeClr val="dk1"/>
+          </a:fillRef>
+          <a:effectRef idx="0">
+            <a:schemeClr val="dk1"/>
+          </a:effectRef>
+          <a:fontRef idx="minor">
+            <a:schemeClr val="tx1"/>
+          </a:fontRef>
+        </p:style>
+      </p:cxnSp>
     </p:spTree>
     <p:extLst>
       <p:ext uri="{BB962C8B-B14F-4D97-AF65-F5344CB8AC3E}">
@@ -3940,7 +4034,7 @@
         <p:spPr>
           <a:xfrm>
             <a:off x="6363846" y="2658874"/>
-            <a:ext cx="2435352" cy="2639441"/>
+            <a:ext cx="2435352" cy="2270109"/>
           </a:xfrm>
           <a:prstGeom prst="rect">
             <a:avLst/>
@@ -3984,13 +4078,22 @@
               </a:lnSpc>
             </a:pPr>
             <a:r>
+              <a:rPr lang="fr-FR" sz="1600" b="1" dirty="0" err="1">
+                <a:solidFill>
+                  <a:srgbClr val="0070C0"/>
+                </a:solidFill>
+                <a:cs typeface="Arial Nova Light" panose="020B0304020202020204" pitchFamily="34" charset="0"/>
+              </a:rPr>
+              <a:t>Workforce</a:t>
+            </a:r>
+            <a:r>
               <a:rPr lang="fr-FR" sz="1600" b="1" dirty="0">
                 <a:solidFill>
                   <a:srgbClr val="0070C0"/>
                 </a:solidFill>
                 <a:cs typeface="Arial Nova Light" panose="020B0304020202020204" pitchFamily="34" charset="0"/>
               </a:rPr>
-              <a:t>Effective:</a:t>
+              <a:t>:</a:t>
             </a:r>
           </a:p>
           <a:p>
@@ -4057,22 +4160,6 @@
               <a:t>End:</a:t>
             </a:r>
           </a:p>
-          <a:p>
-            <a:pPr>
-              <a:lnSpc>
-                <a:spcPct val="150000"/>
-              </a:lnSpc>
-            </a:pPr>
-            <a:r>
-              <a:rPr lang="en-US" sz="1600" b="1" dirty="0">
-                <a:solidFill>
-                  <a:srgbClr val="0070C0"/>
-                </a:solidFill>
-                <a:cs typeface="Arial Nova Light" panose="020B0304020202020204" pitchFamily="34" charset="0"/>
-              </a:rPr>
-              <a:t>Miscellaneous:</a:t>
-            </a:r>
-          </a:p>
         </p:txBody>
       </p:sp>
       <p:sp>
@@ -4090,7 +4177,7 @@
         <p:spPr>
           <a:xfrm>
             <a:off x="7642225" y="2658874"/>
-            <a:ext cx="3278381" cy="2639441"/>
+            <a:ext cx="3278381" cy="2270109"/>
           </a:xfrm>
           <a:prstGeom prst="rect">
             <a:avLst/>
@@ -4125,8 +4212,17 @@
               <a:rPr lang="fr-FR" sz="1600" dirty="0">
                 <a:cs typeface="Arial Nova Light" panose="020B0304020202020204" pitchFamily="34" charset="0"/>
               </a:rPr>
-              <a:t>35 people</a:t>
-            </a:r>
+              <a:t>30 </a:t>
+            </a:r>
+            <a:r>
+              <a:rPr lang="fr-FR" sz="1600" dirty="0" err="1">
+                <a:cs typeface="Arial Nova Light" panose="020B0304020202020204" pitchFamily="34" charset="0"/>
+              </a:rPr>
+              <a:t>students</a:t>
+            </a:r>
+            <a:endParaRPr lang="fr-FR" sz="1600" dirty="0">
+              <a:cs typeface="Arial Nova Light" panose="020B0304020202020204" pitchFamily="34" charset="0"/>
+            </a:endParaRPr>
           </a:p>
           <a:p>
             <a:pPr algn="r">
@@ -4177,20 +4273,7 @@
               <a:rPr lang="en-US" sz="1600" dirty="0">
                 <a:cs typeface="Arial Nova Light" panose="020B0304020202020204" pitchFamily="34" charset="0"/>
               </a:rPr>
-              <a:t>2022</a:t>
-            </a:r>
-          </a:p>
-          <a:p>
-            <a:pPr algn="r">
-              <a:lnSpc>
-                <a:spcPct val="150000"/>
-              </a:lnSpc>
-            </a:pPr>
-            <a:r>
-              <a:rPr lang="en-US" sz="1600" dirty="0">
-                <a:cs typeface="Arial Nova Light" panose="020B0304020202020204" pitchFamily="34" charset="0"/>
-              </a:rPr>
-              <a:t>100% student team</a:t>
+              <a:t>2024</a:t>
             </a:r>
           </a:p>
         </p:txBody>

</xml_diff>